<commit_message>
Update site layout plan
with hole drill locations for penthouse interior access
</commit_message>
<xml_diff>
--- a/Spokane Reference Site Layout.pptx
+++ b/Spokane Reference Site Layout.pptx
@@ -8,8 +8,7 @@
     <p:sldId id="256" r:id="rId2"/>
     <p:sldId id="258" r:id="rId3"/>
     <p:sldId id="257" r:id="rId4"/>
-    <p:sldId id="259" r:id="rId5"/>
-    <p:sldId id="260" r:id="rId6"/>
+    <p:sldId id="261" r:id="rId5"/>
   </p:sldIdLst>
   <p:sldSz cx="12192000" cy="6858000"/>
   <p:notesSz cx="6858000" cy="9144000"/>
@@ -108,6 +107,11 @@
       </a:defRPr>
     </a:lvl9pPr>
   </p:defaultTextStyle>
+  <p:extLst>
+    <p:ext uri="{EFAFB233-063F-42B5-8137-9DF3F51BA10A}">
+      <p15:sldGuideLst xmlns:p15="http://schemas.microsoft.com/office/powerpoint/2012/main"/>
+    </p:ext>
+  </p:extLst>
 </p:presentation>
 </file>
 
@@ -242,7 +246,7 @@
           <a:p>
             <a:fld id="{887FA2FE-798A-4430-AE82-EBBEBF1DE214}" type="datetimeFigureOut">
               <a:rPr lang="en-US" smtClean="0"/>
-              <a:t>2017-05-18</a:t>
+              <a:t>2017-08-02</a:t>
             </a:fld>
             <a:endParaRPr lang="en-US"/>
           </a:p>
@@ -412,7 +416,7 @@
           <a:p>
             <a:fld id="{887FA2FE-798A-4430-AE82-EBBEBF1DE214}" type="datetimeFigureOut">
               <a:rPr lang="en-US" smtClean="0"/>
-              <a:t>2017-05-18</a:t>
+              <a:t>2017-08-02</a:t>
             </a:fld>
             <a:endParaRPr lang="en-US"/>
           </a:p>
@@ -592,7 +596,7 @@
           <a:p>
             <a:fld id="{887FA2FE-798A-4430-AE82-EBBEBF1DE214}" type="datetimeFigureOut">
               <a:rPr lang="en-US" smtClean="0"/>
-              <a:t>2017-05-18</a:t>
+              <a:t>2017-08-02</a:t>
             </a:fld>
             <a:endParaRPr lang="en-US"/>
           </a:p>
@@ -762,7 +766,7 @@
           <a:p>
             <a:fld id="{887FA2FE-798A-4430-AE82-EBBEBF1DE214}" type="datetimeFigureOut">
               <a:rPr lang="en-US" smtClean="0"/>
-              <a:t>2017-05-18</a:t>
+              <a:t>2017-08-02</a:t>
             </a:fld>
             <a:endParaRPr lang="en-US"/>
           </a:p>
@@ -1008,7 +1012,7 @@
           <a:p>
             <a:fld id="{887FA2FE-798A-4430-AE82-EBBEBF1DE214}" type="datetimeFigureOut">
               <a:rPr lang="en-US" smtClean="0"/>
-              <a:t>2017-05-18</a:t>
+              <a:t>2017-08-02</a:t>
             </a:fld>
             <a:endParaRPr lang="en-US"/>
           </a:p>
@@ -1240,7 +1244,7 @@
           <a:p>
             <a:fld id="{887FA2FE-798A-4430-AE82-EBBEBF1DE214}" type="datetimeFigureOut">
               <a:rPr lang="en-US" smtClean="0"/>
-              <a:t>2017-05-18</a:t>
+              <a:t>2017-08-02</a:t>
             </a:fld>
             <a:endParaRPr lang="en-US"/>
           </a:p>
@@ -1607,7 +1611,7 @@
           <a:p>
             <a:fld id="{887FA2FE-798A-4430-AE82-EBBEBF1DE214}" type="datetimeFigureOut">
               <a:rPr lang="en-US" smtClean="0"/>
-              <a:t>2017-05-18</a:t>
+              <a:t>2017-08-02</a:t>
             </a:fld>
             <a:endParaRPr lang="en-US"/>
           </a:p>
@@ -1725,7 +1729,7 @@
           <a:p>
             <a:fld id="{887FA2FE-798A-4430-AE82-EBBEBF1DE214}" type="datetimeFigureOut">
               <a:rPr lang="en-US" smtClean="0"/>
-              <a:t>2017-05-18</a:t>
+              <a:t>2017-08-02</a:t>
             </a:fld>
             <a:endParaRPr lang="en-US"/>
           </a:p>
@@ -1820,7 +1824,7 @@
           <a:p>
             <a:fld id="{887FA2FE-798A-4430-AE82-EBBEBF1DE214}" type="datetimeFigureOut">
               <a:rPr lang="en-US" smtClean="0"/>
-              <a:t>2017-05-18</a:t>
+              <a:t>2017-08-02</a:t>
             </a:fld>
             <a:endParaRPr lang="en-US"/>
           </a:p>
@@ -2097,7 +2101,7 @@
           <a:p>
             <a:fld id="{887FA2FE-798A-4430-AE82-EBBEBF1DE214}" type="datetimeFigureOut">
               <a:rPr lang="en-US" smtClean="0"/>
-              <a:t>2017-05-18</a:t>
+              <a:t>2017-08-02</a:t>
             </a:fld>
             <a:endParaRPr lang="en-US"/>
           </a:p>
@@ -2350,7 +2354,7 @@
           <a:p>
             <a:fld id="{887FA2FE-798A-4430-AE82-EBBEBF1DE214}" type="datetimeFigureOut">
               <a:rPr lang="en-US" smtClean="0"/>
-              <a:t>2017-05-18</a:t>
+              <a:t>2017-08-02</a:t>
             </a:fld>
             <a:endParaRPr lang="en-US"/>
           </a:p>
@@ -2563,7 +2567,7 @@
           <a:p>
             <a:fld id="{887FA2FE-798A-4430-AE82-EBBEBF1DE214}" type="datetimeFigureOut">
               <a:rPr lang="en-US" smtClean="0"/>
-              <a:t>2017-05-18</a:t>
+              <a:t>2017-08-02</a:t>
             </a:fld>
             <a:endParaRPr lang="en-US"/>
           </a:p>
@@ -3024,6 +3028,36 @@
           </a:p>
         </p:txBody>
       </p:sp>
+      <p:sp>
+        <p:nvSpPr>
+          <p:cNvPr id="4" name="TextBox 3"/>
+          <p:cNvSpPr txBox="1"/>
+          <p:nvPr/>
+        </p:nvSpPr>
+        <p:spPr>
+          <a:xfrm>
+            <a:off x="10338318" y="6092889"/>
+            <a:ext cx="1483568" cy="369332"/>
+          </a:xfrm>
+          <a:prstGeom prst="rect">
+            <a:avLst/>
+          </a:prstGeom>
+          <a:noFill/>
+        </p:spPr>
+        <p:txBody>
+          <a:bodyPr wrap="square" rtlCol="0">
+            <a:spAutoFit/>
+          </a:bodyPr>
+          <a:lstStyle/>
+          <a:p>
+            <a:r>
+              <a:rPr lang="en-US" dirty="0" smtClean="0"/>
+              <a:t>2017-08-02</a:t>
+            </a:r>
+            <a:endParaRPr lang="en-US" dirty="0"/>
+          </a:p>
+        </p:txBody>
+      </p:sp>
     </p:spTree>
     <p:extLst>
       <p:ext uri="{BB962C8B-B14F-4D97-AF65-F5344CB8AC3E}">
@@ -3054,9 +3088,39 @@
           <a:chExt cx="0" cy="0"/>
         </a:xfrm>
       </p:grpSpPr>
+      <p:sp>
+        <p:nvSpPr>
+          <p:cNvPr id="8" name="TextBox 7"/>
+          <p:cNvSpPr txBox="1"/>
+          <p:nvPr/>
+        </p:nvSpPr>
+        <p:spPr>
+          <a:xfrm>
+            <a:off x="745067" y="135467"/>
+            <a:ext cx="8128000" cy="369332"/>
+          </a:xfrm>
+          <a:prstGeom prst="rect">
+            <a:avLst/>
+          </a:prstGeom>
+          <a:noFill/>
+        </p:spPr>
+        <p:txBody>
+          <a:bodyPr wrap="square" rtlCol="0">
+            <a:spAutoFit/>
+          </a:bodyPr>
+          <a:lstStyle/>
+          <a:p>
+            <a:r>
+              <a:rPr lang="en-US" dirty="0" smtClean="0"/>
+              <a:t>Orientation view: WSU Spokane campus</a:t>
+            </a:r>
+            <a:endParaRPr lang="en-US" dirty="0"/>
+          </a:p>
+        </p:txBody>
+      </p:sp>
       <p:pic>
         <p:nvPicPr>
-          <p:cNvPr id="4" name="Picture 3"/>
+          <p:cNvPr id="2" name="Picture 1"/>
           <p:cNvPicPr>
             <a:picLocks noChangeAspect="1"/>
           </p:cNvPicPr>
@@ -3070,44 +3134,14 @@
         </p:blipFill>
         <p:spPr>
           <a:xfrm>
-            <a:off x="778933" y="757548"/>
-            <a:ext cx="10640516" cy="5993207"/>
+            <a:off x="1034125" y="494412"/>
+            <a:ext cx="9993120" cy="6363588"/>
           </a:xfrm>
           <a:prstGeom prst="rect">
             <a:avLst/>
           </a:prstGeom>
         </p:spPr>
       </p:pic>
-      <p:sp>
-        <p:nvSpPr>
-          <p:cNvPr id="8" name="TextBox 7"/>
-          <p:cNvSpPr txBox="1"/>
-          <p:nvPr/>
-        </p:nvSpPr>
-        <p:spPr>
-          <a:xfrm>
-            <a:off x="745067" y="135467"/>
-            <a:ext cx="8128000" cy="369332"/>
-          </a:xfrm>
-          <a:prstGeom prst="rect">
-            <a:avLst/>
-          </a:prstGeom>
-          <a:noFill/>
-        </p:spPr>
-        <p:txBody>
-          <a:bodyPr wrap="square" rtlCol="0">
-            <a:spAutoFit/>
-          </a:bodyPr>
-          <a:lstStyle/>
-          <a:p>
-            <a:r>
-              <a:rPr lang="en-US" dirty="0" smtClean="0"/>
-              <a:t>Orientation view: WSU Spokane campus</a:t>
-            </a:r>
-            <a:endParaRPr lang="en-US" dirty="0"/>
-          </a:p>
-        </p:txBody>
-      </p:sp>
     </p:spTree>
     <p:extLst>
       <p:ext uri="{BB962C8B-B14F-4D97-AF65-F5344CB8AC3E}">
@@ -3140,7 +3174,7 @@
       </p:grpSpPr>
       <p:pic>
         <p:nvPicPr>
-          <p:cNvPr id="5" name="Picture 4"/>
+          <p:cNvPr id="3" name="Picture 2"/>
           <p:cNvPicPr>
             <a:picLocks noChangeAspect="1"/>
           </p:cNvPicPr>
@@ -3154,8 +3188,8 @@
         </p:blipFill>
         <p:spPr>
           <a:xfrm>
-            <a:off x="172377" y="317284"/>
-            <a:ext cx="7592485" cy="6354062"/>
+            <a:off x="171598" y="151164"/>
+            <a:ext cx="9030960" cy="6601746"/>
           </a:xfrm>
           <a:prstGeom prst="rect">
             <a:avLst/>
@@ -3178,7 +3212,7 @@
         </p:blipFill>
         <p:spPr>
           <a:xfrm>
-            <a:off x="6851722" y="2633685"/>
+            <a:off x="7056996" y="2904273"/>
             <a:ext cx="5001323" cy="3848637"/>
           </a:xfrm>
           <a:prstGeom prst="rect">
@@ -3186,49 +3220,6 @@
           </a:prstGeom>
         </p:spPr>
       </p:pic>
-      <p:sp>
-        <p:nvSpPr>
-          <p:cNvPr id="7" name="TextBox 6"/>
-          <p:cNvSpPr txBox="1"/>
-          <p:nvPr/>
-        </p:nvSpPr>
-        <p:spPr>
-          <a:xfrm>
-            <a:off x="7981244" y="317284"/>
-            <a:ext cx="4075289" cy="1200329"/>
-          </a:xfrm>
-          <a:prstGeom prst="rect">
-            <a:avLst/>
-          </a:prstGeom>
-          <a:noFill/>
-        </p:spPr>
-        <p:txBody>
-          <a:bodyPr wrap="square" rtlCol="0">
-            <a:spAutoFit/>
-          </a:bodyPr>
-          <a:lstStyle/>
-          <a:p>
-            <a:r>
-              <a:rPr lang="en-US" dirty="0" smtClean="0"/>
-              <a:t>Site Layout</a:t>
-            </a:r>
-          </a:p>
-          <a:p>
-            <a:endParaRPr lang="en-US" dirty="0"/>
-          </a:p>
-          <a:p>
-            <a:pPr marL="285750" indent="-285750">
-              <a:buFont typeface="Arial" panose="020B0604020202020204" pitchFamily="34" charset="0"/>
-              <a:buChar char="•"/>
-            </a:pPr>
-            <a:r>
-              <a:rPr lang="en-US" dirty="0" smtClean="0"/>
-              <a:t>Sampling location potentially impaired by penthouse</a:t>
-            </a:r>
-            <a:endParaRPr lang="en-US" dirty="0"/>
-          </a:p>
-        </p:txBody>
-      </p:sp>
     </p:spTree>
     <p:extLst>
       <p:ext uri="{BB962C8B-B14F-4D97-AF65-F5344CB8AC3E}">
@@ -3259,80 +3250,46 @@
           <a:chExt cx="0" cy="0"/>
         </a:xfrm>
       </p:grpSpPr>
-      <p:pic>
-        <p:nvPicPr>
-          <p:cNvPr id="2" name="Picture 1"/>
-          <p:cNvPicPr>
-            <a:picLocks noChangeAspect="1"/>
-          </p:cNvPicPr>
+      <p:sp>
+        <p:nvSpPr>
+          <p:cNvPr id="2" name="Title 1"/>
+          <p:cNvSpPr>
+            <a:spLocks noGrp="1"/>
+          </p:cNvSpPr>
+          <p:nvPr>
+            <p:ph type="title"/>
+          </p:nvPr>
+        </p:nvSpPr>
+        <p:spPr/>
+        <p:txBody>
+          <a:bodyPr/>
+          <a:lstStyle/>
+          <a:p>
+            <a:r>
+              <a:rPr lang="en-US" dirty="0" smtClean="0"/>
+              <a:t>Proposed Location of Access Holes</a:t>
+            </a:r>
+            <a:endParaRPr lang="en-US" dirty="0"/>
+          </a:p>
+        </p:txBody>
+      </p:sp>
+      <p:sp>
+        <p:nvSpPr>
+          <p:cNvPr id="4" name="Rectangle 3"/>
+          <p:cNvSpPr/>
           <p:nvPr/>
-        </p:nvPicPr>
-        <p:blipFill>
-          <a:blip r:embed="rId2"/>
-          <a:stretch>
-            <a:fillRect/>
-          </a:stretch>
-        </p:blipFill>
-        <p:spPr>
-          <a:xfrm>
-            <a:off x="1378179" y="1833633"/>
-            <a:ext cx="9345329" cy="4048690"/>
+        </p:nvSpPr>
+        <p:spPr>
+          <a:xfrm rot="-2640000">
+            <a:off x="1295400" y="2794536"/>
+            <a:ext cx="3886200" cy="1752600"/>
           </a:xfrm>
           <a:prstGeom prst="rect">
             <a:avLst/>
           </a:prstGeom>
-        </p:spPr>
-      </p:pic>
-      <p:sp>
-        <p:nvSpPr>
-          <p:cNvPr id="3" name="TextBox 2"/>
-          <p:cNvSpPr txBox="1"/>
-          <p:nvPr/>
-        </p:nvSpPr>
-        <p:spPr>
-          <a:xfrm>
-            <a:off x="1378179" y="699910"/>
-            <a:ext cx="7856132" cy="369332"/>
-          </a:xfrm>
-          <a:prstGeom prst="rect">
-            <a:avLst/>
-          </a:prstGeom>
-          <a:noFill/>
-        </p:spPr>
-        <p:txBody>
-          <a:bodyPr wrap="square" rtlCol="0">
-            <a:spAutoFit/>
-          </a:bodyPr>
-          <a:lstStyle/>
-          <a:p>
-            <a:r>
-              <a:rPr lang="en-US" dirty="0" smtClean="0"/>
-              <a:t>Data for Spokane Airport</a:t>
-            </a:r>
-            <a:endParaRPr lang="en-US" dirty="0"/>
-          </a:p>
-        </p:txBody>
-      </p:sp>
-      <p:sp>
-        <p:nvSpPr>
-          <p:cNvPr id="4" name="Rectangle 3"/>
-          <p:cNvSpPr/>
-          <p:nvPr/>
-        </p:nvSpPr>
-        <p:spPr>
-          <a:xfrm>
-            <a:off x="3668889" y="1343379"/>
-            <a:ext cx="1038578" cy="2822221"/>
-          </a:xfrm>
-          <a:prstGeom prst="rect">
-            <a:avLst/>
-          </a:prstGeom>
-          <a:noFill/>
-          <a:ln w="28575">
-            <a:solidFill>
-              <a:srgbClr val="FF0000"/>
-            </a:solidFill>
-          </a:ln>
+          <a:solidFill>
+            <a:srgbClr val="FF0000"/>
+          </a:solidFill>
         </p:spPr>
         <p:style>
           <a:lnRef idx="2">
@@ -3359,26 +3316,127 @@
           </a:p>
         </p:txBody>
       </p:sp>
-      <p:sp>
-        <p:nvSpPr>
-          <p:cNvPr id="5" name="Rectangle 4"/>
-          <p:cNvSpPr/>
+      <p:cxnSp>
+        <p:nvCxnSpPr>
+          <p:cNvPr id="8" name="Straight Arrow Connector 7"/>
+          <p:cNvCxnSpPr/>
           <p:nvPr/>
+        </p:nvCxnSpPr>
+        <p:spPr>
+          <a:xfrm flipV="1">
+            <a:off x="1232021" y="4609069"/>
+            <a:ext cx="164494" cy="1317599"/>
+          </a:xfrm>
+          <a:prstGeom prst="straightConnector1">
+            <a:avLst/>
+          </a:prstGeom>
+          <a:ln>
+            <a:tailEnd type="triangle"/>
+          </a:ln>
+        </p:spPr>
+        <p:style>
+          <a:lnRef idx="1">
+            <a:schemeClr val="accent1"/>
+          </a:lnRef>
+          <a:fillRef idx="0">
+            <a:schemeClr val="accent1"/>
+          </a:fillRef>
+          <a:effectRef idx="0">
+            <a:schemeClr val="accent1"/>
+          </a:effectRef>
+          <a:fontRef idx="minor">
+            <a:schemeClr val="tx1"/>
+          </a:fontRef>
+        </p:style>
+      </p:cxnSp>
+      <p:sp>
+        <p:nvSpPr>
+          <p:cNvPr id="9" name="TextBox 8"/>
+          <p:cNvSpPr txBox="1"/>
+          <p:nvPr/>
         </p:nvSpPr>
         <p:spPr>
           <a:xfrm>
-            <a:off x="8331199" y="1343379"/>
-            <a:ext cx="491067" cy="2822221"/>
+            <a:off x="2662766" y="3177679"/>
+            <a:ext cx="1293414" cy="923330"/>
           </a:xfrm>
           <a:prstGeom prst="rect">
             <a:avLst/>
           </a:prstGeom>
           <a:noFill/>
-          <a:ln w="28575">
-            <a:solidFill>
-              <a:srgbClr val="FF0000"/>
-            </a:solidFill>
-          </a:ln>
+        </p:spPr>
+        <p:txBody>
+          <a:bodyPr wrap="square" rtlCol="0">
+            <a:spAutoFit/>
+          </a:bodyPr>
+          <a:lstStyle/>
+          <a:p>
+            <a:r>
+              <a:rPr lang="en-US" dirty="0" smtClean="0"/>
+              <a:t>Top View</a:t>
+            </a:r>
+          </a:p>
+          <a:p>
+            <a:r>
+              <a:rPr lang="en-US" dirty="0" smtClean="0"/>
+              <a:t>Of </a:t>
+            </a:r>
+            <a:r>
+              <a:rPr lang="en-US" dirty="0" smtClean="0"/>
+              <a:t>Penthouse</a:t>
+            </a:r>
+            <a:endParaRPr lang="en-US" dirty="0"/>
+          </a:p>
+        </p:txBody>
+      </p:sp>
+      <p:sp>
+        <p:nvSpPr>
+          <p:cNvPr id="10" name="TextBox 9"/>
+          <p:cNvSpPr txBox="1"/>
+          <p:nvPr/>
+        </p:nvSpPr>
+        <p:spPr>
+          <a:xfrm>
+            <a:off x="127000" y="5273134"/>
+            <a:ext cx="1105021" cy="923330"/>
+          </a:xfrm>
+          <a:prstGeom prst="rect">
+            <a:avLst/>
+          </a:prstGeom>
+          <a:noFill/>
+        </p:spPr>
+        <p:txBody>
+          <a:bodyPr wrap="square" rtlCol="0">
+            <a:spAutoFit/>
+          </a:bodyPr>
+          <a:lstStyle/>
+          <a:p>
+            <a:r>
+              <a:rPr lang="en-US" dirty="0" smtClean="0"/>
+              <a:t>Proposed Location of </a:t>
+            </a:r>
+            <a:r>
+              <a:rPr lang="en-US" dirty="0" smtClean="0"/>
+              <a:t>Holes</a:t>
+            </a:r>
+            <a:endParaRPr lang="en-US" dirty="0"/>
+          </a:p>
+        </p:txBody>
+      </p:sp>
+      <p:sp>
+        <p:nvSpPr>
+          <p:cNvPr id="11" name="Rectangle 10"/>
+          <p:cNvSpPr/>
+          <p:nvPr/>
+        </p:nvSpPr>
+        <p:spPr>
+          <a:xfrm>
+            <a:off x="6223000" y="2472267"/>
+            <a:ext cx="4555067" cy="1955800"/>
+          </a:xfrm>
+          <a:prstGeom prst="rect">
+            <a:avLst/>
+          </a:prstGeom>
         </p:spPr>
         <p:style>
           <a:lnRef idx="2">
@@ -3401,26 +3459,47 @@
           <a:lstStyle/>
           <a:p>
             <a:pPr algn="ctr"/>
-            <a:endParaRPr lang="en-US"/>
-          </a:p>
-        </p:txBody>
-      </p:sp>
-      <p:sp>
-        <p:nvSpPr>
-          <p:cNvPr id="6" name="Rectangle 5"/>
+            <a:r>
+              <a:rPr lang="en-US" dirty="0" smtClean="0"/>
+              <a:t>SW Wall</a:t>
+            </a:r>
+            <a:endParaRPr lang="en-US" dirty="0" smtClean="0"/>
+          </a:p>
+          <a:p>
+            <a:pPr algn="ctr"/>
+            <a:r>
+              <a:rPr lang="en-US" dirty="0" smtClean="0"/>
+              <a:t>(not to scale</a:t>
+            </a:r>
+            <a:r>
+              <a:rPr lang="mr-IN" dirty="0" smtClean="0"/>
+              <a:t>…</a:t>
+            </a:r>
+            <a:r>
+              <a:rPr lang="en-US" dirty="0" smtClean="0"/>
+              <a:t>)</a:t>
+            </a:r>
+            <a:endParaRPr lang="en-US" dirty="0"/>
+          </a:p>
+        </p:txBody>
+      </p:sp>
+      <p:sp>
+        <p:nvSpPr>
+          <p:cNvPr id="12" name="Oval 11"/>
           <p:cNvSpPr/>
           <p:nvPr/>
         </p:nvSpPr>
         <p:spPr>
           <a:xfrm>
-            <a:off x="4737100" y="1833632"/>
-            <a:ext cx="3562351" cy="2822222"/>
-          </a:xfrm>
-          <a:prstGeom prst="rect">
+            <a:off x="6669682" y="3948669"/>
+            <a:ext cx="127000" cy="135467"/>
+          </a:xfrm>
+          <a:prstGeom prst="ellipse">
             <a:avLst/>
           </a:prstGeom>
-          <a:noFill/>
-          <a:ln w="28575"/>
+          <a:solidFill>
+            <a:srgbClr val="FFFF00"/>
+          </a:solidFill>
         </p:spPr>
         <p:style>
           <a:lnRef idx="2">
@@ -3449,24 +3528,23 @@
       </p:sp>
       <p:sp>
         <p:nvSpPr>
-          <p:cNvPr id="7" name="Rectangle 6"/>
+          <p:cNvPr id="13" name="Oval 12"/>
           <p:cNvSpPr/>
           <p:nvPr/>
         </p:nvSpPr>
         <p:spPr>
           <a:xfrm>
-            <a:off x="9364132" y="1343378"/>
-            <a:ext cx="491067" cy="2822221"/>
-          </a:xfrm>
-          <a:prstGeom prst="rect">
+            <a:off x="6855943" y="3948669"/>
+            <a:ext cx="127000" cy="135467"/>
+          </a:xfrm>
+          <a:prstGeom prst="ellipse">
             <a:avLst/>
           </a:prstGeom>
-          <a:noFill/>
-          <a:ln w="28575">
-            <a:solidFill>
-              <a:srgbClr val="FF0000"/>
-            </a:solidFill>
-          </a:ln>
+          <a:solidFill>
+            <a:srgbClr val="FFFF00">
+              <a:alpha val="50000"/>
+            </a:srgbClr>
+          </a:solidFill>
         </p:spPr>
         <p:style>
           <a:lnRef idx="2">
@@ -3493,22 +3571,288 @@
           </a:p>
         </p:txBody>
       </p:sp>
-      <p:sp>
-        <p:nvSpPr>
-          <p:cNvPr id="8" name="Rectangle 7"/>
-          <p:cNvSpPr/>
+      <p:cxnSp>
+        <p:nvCxnSpPr>
+          <p:cNvPr id="15" name="Straight Connector 14"/>
+          <p:cNvCxnSpPr/>
           <p:nvPr/>
-        </p:nvSpPr>
+        </p:nvCxnSpPr>
         <p:spPr>
           <a:xfrm>
-            <a:off x="8854014" y="1835150"/>
-            <a:ext cx="480486" cy="2820704"/>
+            <a:off x="6910987" y="4321204"/>
+            <a:ext cx="0" cy="524933"/>
+          </a:xfrm>
+          <a:prstGeom prst="line">
+            <a:avLst/>
+          </a:prstGeom>
+          <a:ln w="12700">
+            <a:solidFill>
+              <a:schemeClr val="tx1"/>
+            </a:solidFill>
+          </a:ln>
+        </p:spPr>
+        <p:style>
+          <a:lnRef idx="1">
+            <a:schemeClr val="accent1"/>
+          </a:lnRef>
+          <a:fillRef idx="0">
+            <a:schemeClr val="accent1"/>
+          </a:fillRef>
+          <a:effectRef idx="0">
+            <a:schemeClr val="accent1"/>
+          </a:effectRef>
+          <a:fontRef idx="minor">
+            <a:schemeClr val="tx1"/>
+          </a:fontRef>
+        </p:style>
+      </p:cxnSp>
+      <p:cxnSp>
+        <p:nvCxnSpPr>
+          <p:cNvPr id="16" name="Straight Connector 15"/>
+          <p:cNvCxnSpPr/>
+          <p:nvPr/>
+        </p:nvCxnSpPr>
+        <p:spPr>
+          <a:xfrm>
+            <a:off x="6724715" y="4321204"/>
+            <a:ext cx="0" cy="524933"/>
+          </a:xfrm>
+          <a:prstGeom prst="line">
+            <a:avLst/>
+          </a:prstGeom>
+          <a:ln w="12700">
+            <a:solidFill>
+              <a:schemeClr val="tx1"/>
+            </a:solidFill>
+          </a:ln>
+        </p:spPr>
+        <p:style>
+          <a:lnRef idx="1">
+            <a:schemeClr val="accent1"/>
+          </a:lnRef>
+          <a:fillRef idx="0">
+            <a:schemeClr val="accent1"/>
+          </a:fillRef>
+          <a:effectRef idx="0">
+            <a:schemeClr val="accent1"/>
+          </a:effectRef>
+          <a:fontRef idx="minor">
+            <a:schemeClr val="tx1"/>
+          </a:fontRef>
+        </p:style>
+      </p:cxnSp>
+      <p:cxnSp>
+        <p:nvCxnSpPr>
+          <p:cNvPr id="18" name="Straight Connector 17"/>
+          <p:cNvCxnSpPr/>
+          <p:nvPr/>
+        </p:nvCxnSpPr>
+        <p:spPr>
+          <a:xfrm flipV="1">
+            <a:off x="5514968" y="3999674"/>
+            <a:ext cx="584200" cy="1"/>
+          </a:xfrm>
+          <a:prstGeom prst="line">
+            <a:avLst/>
+          </a:prstGeom>
+          <a:ln w="12700">
+            <a:solidFill>
+              <a:schemeClr val="tx1"/>
+            </a:solidFill>
+          </a:ln>
+        </p:spPr>
+        <p:style>
+          <a:lnRef idx="1">
+            <a:schemeClr val="accent1"/>
+          </a:lnRef>
+          <a:fillRef idx="0">
+            <a:schemeClr val="accent1"/>
+          </a:fillRef>
+          <a:effectRef idx="0">
+            <a:schemeClr val="accent1"/>
+          </a:effectRef>
+          <a:fontRef idx="minor">
+            <a:schemeClr val="tx1"/>
+          </a:fontRef>
+        </p:style>
+      </p:cxnSp>
+      <p:cxnSp>
+        <p:nvCxnSpPr>
+          <p:cNvPr id="21" name="Straight Connector 20"/>
+          <p:cNvCxnSpPr/>
+          <p:nvPr/>
+        </p:nvCxnSpPr>
+        <p:spPr>
+          <a:xfrm flipV="1">
+            <a:off x="5514968" y="4428066"/>
+            <a:ext cx="584200" cy="1"/>
+          </a:xfrm>
+          <a:prstGeom prst="line">
+            <a:avLst/>
+          </a:prstGeom>
+          <a:ln w="12700">
+            <a:solidFill>
+              <a:schemeClr val="tx1"/>
+            </a:solidFill>
+          </a:ln>
+        </p:spPr>
+        <p:style>
+          <a:lnRef idx="1">
+            <a:schemeClr val="accent1"/>
+          </a:lnRef>
+          <a:fillRef idx="0">
+            <a:schemeClr val="accent1"/>
+          </a:fillRef>
+          <a:effectRef idx="0">
+            <a:schemeClr val="accent1"/>
+          </a:effectRef>
+          <a:fontRef idx="minor">
+            <a:schemeClr val="tx1"/>
+          </a:fontRef>
+        </p:style>
+      </p:cxnSp>
+      <p:sp>
+        <p:nvSpPr>
+          <p:cNvPr id="22" name="TextBox 21"/>
+          <p:cNvSpPr txBox="1"/>
+          <p:nvPr/>
+        </p:nvSpPr>
+        <p:spPr>
+          <a:xfrm>
+            <a:off x="5169159" y="4084136"/>
+            <a:ext cx="982885" cy="369332"/>
           </a:xfrm>
           <a:prstGeom prst="rect">
             <a:avLst/>
           </a:prstGeom>
           <a:noFill/>
-          <a:ln w="28575"/>
+        </p:spPr>
+        <p:txBody>
+          <a:bodyPr wrap="square" rtlCol="0">
+            <a:spAutoFit/>
+          </a:bodyPr>
+          <a:lstStyle/>
+          <a:p>
+            <a:r>
+              <a:rPr lang="en-US" dirty="0" smtClean="0"/>
+              <a:t>min 12</a:t>
+            </a:r>
+            <a:r>
+              <a:rPr lang="en-US" dirty="0" smtClean="0"/>
+              <a:t>”</a:t>
+            </a:r>
+            <a:endParaRPr lang="en-US" dirty="0"/>
+          </a:p>
+        </p:txBody>
+      </p:sp>
+      <p:sp>
+        <p:nvSpPr>
+          <p:cNvPr id="24" name="TextBox 23"/>
+          <p:cNvSpPr txBox="1"/>
+          <p:nvPr/>
+        </p:nvSpPr>
+        <p:spPr>
+          <a:xfrm>
+            <a:off x="6637925" y="4476805"/>
+            <a:ext cx="499536" cy="369332"/>
+          </a:xfrm>
+          <a:prstGeom prst="rect">
+            <a:avLst/>
+          </a:prstGeom>
+          <a:noFill/>
+        </p:spPr>
+        <p:txBody>
+          <a:bodyPr wrap="square" rtlCol="0">
+            <a:spAutoFit/>
+          </a:bodyPr>
+          <a:lstStyle/>
+          <a:p>
+            <a:r>
+              <a:rPr lang="en-US" dirty="0"/>
+              <a:t>6</a:t>
+            </a:r>
+            <a:r>
+              <a:rPr lang="en-US" dirty="0" smtClean="0"/>
+              <a:t>”</a:t>
+            </a:r>
+            <a:endParaRPr lang="en-US" dirty="0"/>
+          </a:p>
+        </p:txBody>
+      </p:sp>
+      <p:sp>
+        <p:nvSpPr>
+          <p:cNvPr id="3" name="TextBox 2"/>
+          <p:cNvSpPr txBox="1"/>
+          <p:nvPr/>
+        </p:nvSpPr>
+        <p:spPr>
+          <a:xfrm>
+            <a:off x="7360170" y="5273134"/>
+            <a:ext cx="3807502" cy="369332"/>
+          </a:xfrm>
+          <a:prstGeom prst="rect">
+            <a:avLst/>
+          </a:prstGeom>
+          <a:noFill/>
+        </p:spPr>
+        <p:txBody>
+          <a:bodyPr wrap="square" rtlCol="0">
+            <a:spAutoFit/>
+          </a:bodyPr>
+          <a:lstStyle/>
+          <a:p>
+            <a:r>
+              <a:rPr lang="en-US" dirty="0" smtClean="0"/>
+              <a:t>Possible locations for holes</a:t>
+            </a:r>
+            <a:endParaRPr lang="en-US" dirty="0"/>
+          </a:p>
+        </p:txBody>
+      </p:sp>
+      <p:sp>
+        <p:nvSpPr>
+          <p:cNvPr id="5" name="TextBox 4"/>
+          <p:cNvSpPr txBox="1"/>
+          <p:nvPr/>
+        </p:nvSpPr>
+        <p:spPr>
+          <a:xfrm>
+            <a:off x="65807" y="3812230"/>
+            <a:ext cx="1618938" cy="646331"/>
+          </a:xfrm>
+          <a:prstGeom prst="rect">
+            <a:avLst/>
+          </a:prstGeom>
+          <a:noFill/>
+        </p:spPr>
+        <p:txBody>
+          <a:bodyPr wrap="square" rtlCol="0">
+            <a:spAutoFit/>
+          </a:bodyPr>
+          <a:lstStyle/>
+          <a:p>
+            <a:r>
+              <a:rPr lang="en-US" dirty="0" smtClean="0"/>
+              <a:t>Tripod inlet here</a:t>
+            </a:r>
+            <a:endParaRPr lang="en-US" dirty="0"/>
+          </a:p>
+        </p:txBody>
+      </p:sp>
+      <p:sp>
+        <p:nvSpPr>
+          <p:cNvPr id="6" name="5-Point Star 5"/>
+          <p:cNvSpPr/>
+          <p:nvPr/>
+        </p:nvSpPr>
+        <p:spPr>
+          <a:xfrm>
+            <a:off x="439045" y="4392769"/>
+            <a:ext cx="240466" cy="323165"/>
+          </a:xfrm>
+          <a:prstGeom prst="star5">
+            <a:avLst/>
+          </a:prstGeom>
         </p:spPr>
         <p:style>
           <a:lnRef idx="2">
@@ -3535,128 +3879,57 @@
           </a:p>
         </p:txBody>
       </p:sp>
+      <p:sp>
+        <p:nvSpPr>
+          <p:cNvPr id="14" name="TextBox 13"/>
+          <p:cNvSpPr txBox="1"/>
+          <p:nvPr/>
+        </p:nvSpPr>
+        <p:spPr>
+          <a:xfrm>
+            <a:off x="6389875" y="3277969"/>
+            <a:ext cx="1138334" cy="646331"/>
+          </a:xfrm>
+          <a:prstGeom prst="rect">
+            <a:avLst/>
+          </a:prstGeom>
+          <a:noFill/>
+        </p:spPr>
+        <p:txBody>
+          <a:bodyPr wrap="square" rtlCol="0">
+            <a:spAutoFit/>
+          </a:bodyPr>
+          <a:lstStyle/>
+          <a:p>
+            <a:r>
+              <a:rPr lang="en-US" dirty="0" smtClean="0"/>
+              <a:t>1.5-2” Ø </a:t>
+            </a:r>
+            <a:r>
+              <a:rPr lang="en-US" i="1" dirty="0" smtClean="0"/>
+              <a:t>or 2 @ 1”</a:t>
+            </a:r>
+            <a:endParaRPr lang="en-US" i="1" dirty="0"/>
+          </a:p>
+        </p:txBody>
+      </p:sp>
     </p:spTree>
     <p:extLst>
       <p:ext uri="{BB962C8B-B14F-4D97-AF65-F5344CB8AC3E}">
-        <p14:creationId xmlns:p14="http://schemas.microsoft.com/office/powerpoint/2010/main" val="4139200190"/>
+        <p14:creationId xmlns:p14="http://schemas.microsoft.com/office/powerpoint/2010/main" val="1068170605"/>
       </p:ext>
     </p:extLst>
   </p:cSld>
   <p:clrMapOvr>
     <a:masterClrMapping/>
   </p:clrMapOvr>
-</p:sld>
-</file>
-
-<file path=ppt/slides/slide5.xml><?xml version="1.0" encoding="utf-8"?>
-<p:sld xmlns:a="http://schemas.openxmlformats.org/drawingml/2006/main" xmlns:r="http://schemas.openxmlformats.org/officeDocument/2006/relationships" xmlns:p="http://schemas.openxmlformats.org/presentationml/2006/main">
-  <p:cSld>
-    <p:spTree>
-      <p:nvGrpSpPr>
-        <p:cNvPr id="1" name=""/>
-        <p:cNvGrpSpPr/>
-        <p:nvPr/>
-      </p:nvGrpSpPr>
-      <p:grpSpPr>
-        <a:xfrm>
-          <a:off x="0" y="0"/>
-          <a:ext cx="0" cy="0"/>
-          <a:chOff x="0" y="0"/>
-          <a:chExt cx="0" cy="0"/>
-        </a:xfrm>
-      </p:grpSpPr>
-      <p:sp>
-        <p:nvSpPr>
-          <p:cNvPr id="2" name="Title 1"/>
-          <p:cNvSpPr>
-            <a:spLocks noGrp="1"/>
-          </p:cNvSpPr>
-          <p:nvPr>
-            <p:ph type="title"/>
-          </p:nvPr>
-        </p:nvSpPr>
-        <p:spPr/>
-        <p:txBody>
-          <a:bodyPr/>
-          <a:lstStyle/>
-          <a:p>
-            <a:r>
-              <a:rPr lang="en-US" dirty="0" smtClean="0"/>
-              <a:t>?s</a:t>
-            </a:r>
-            <a:endParaRPr lang="en-US" dirty="0"/>
-          </a:p>
-        </p:txBody>
-      </p:sp>
-      <p:sp>
-        <p:nvSpPr>
-          <p:cNvPr id="3" name="Content Placeholder 2"/>
-          <p:cNvSpPr>
-            <a:spLocks noGrp="1"/>
-          </p:cNvSpPr>
-          <p:nvPr>
-            <p:ph idx="1"/>
-          </p:nvPr>
-        </p:nvSpPr>
-        <p:spPr/>
-        <p:txBody>
-          <a:bodyPr/>
-          <a:lstStyle/>
-          <a:p>
-            <a:r>
-              <a:rPr lang="en-US" dirty="0" smtClean="0"/>
-              <a:t>Continue without changes?</a:t>
-            </a:r>
-          </a:p>
-          <a:p>
-            <a:pPr lvl="1"/>
-            <a:r>
-              <a:rPr lang="en-US" dirty="0" smtClean="0"/>
-              <a:t>Data was for airport, which may not represent downtown</a:t>
-            </a:r>
-          </a:p>
-          <a:p>
-            <a:pPr lvl="1"/>
-            <a:r>
-              <a:rPr lang="en-US" dirty="0" smtClean="0"/>
-              <a:t>Data was constrained to daytimes (7a-7p)</a:t>
-            </a:r>
-          </a:p>
-          <a:p>
-            <a:r>
-              <a:rPr lang="en-US" dirty="0" smtClean="0"/>
-              <a:t>Revisit location on current rooftop? </a:t>
-            </a:r>
-          </a:p>
-          <a:p>
-            <a:r>
-              <a:rPr lang="en-US" dirty="0" smtClean="0"/>
-              <a:t>Put equipment on penthouse?</a:t>
-            </a:r>
-          </a:p>
-          <a:p>
-            <a:pPr lvl="1"/>
-            <a:r>
-              <a:rPr lang="en-US" dirty="0" smtClean="0"/>
-              <a:t>Not if restricted to ladder access (probably the case)</a:t>
-            </a:r>
-          </a:p>
-          <a:p>
-            <a:pPr lvl="1"/>
-            <a:endParaRPr lang="en-US" dirty="0"/>
-          </a:p>
-        </p:txBody>
-      </p:sp>
-    </p:spTree>
-    <p:extLst>
-      <p:ext uri="{BB962C8B-B14F-4D97-AF65-F5344CB8AC3E}">
-        <p14:creationId xmlns:p14="http://schemas.microsoft.com/office/powerpoint/2010/main" val="2582780432"/>
-      </p:ext>
-    </p:extLst>
-  </p:cSld>
-  <p:clrMapOvr>
-    <a:masterClrMapping/>
-  </p:clrMapOvr>
+  <p:timing>
+    <p:tnLst>
+      <p:par>
+        <p:cTn id="1" dur="indefinite" restart="never" nodeType="tmRoot"/>
+      </p:par>
+    </p:tnLst>
+  </p:timing>
 </p:sld>
 </file>
 

</xml_diff>